<commit_message>
adjusted ppt final slide
</commit_message>
<xml_diff>
--- a/Final_Presentation.pptx
+++ b/Final_Presentation.pptx
@@ -14,9 +14,9 @@
     <p:sldId id="267" r:id="rId8"/>
     <p:sldId id="271" r:id="rId9"/>
     <p:sldId id="269" r:id="rId10"/>
-    <p:sldId id="270" r:id="rId11"/>
-    <p:sldId id="265" r:id="rId12"/>
-    <p:sldId id="266" r:id="rId13"/>
+    <p:sldId id="265" r:id="rId11"/>
+    <p:sldId id="266" r:id="rId12"/>
+    <p:sldId id="270" r:id="rId13"/>
   </p:sldIdLst>
   <p:sldSz cx="12192000" cy="6858000"/>
   <p:notesSz cx="6858000" cy="9144000"/>
@@ -4056,6 +4056,378 @@
 <file path=ppt/slides/slide10.xml><?xml version="1.0" encoding="utf-8"?>
 <p:sld xmlns:a="http://schemas.openxmlformats.org/drawingml/2006/main" xmlns:r="http://schemas.openxmlformats.org/officeDocument/2006/relationships" xmlns:p="http://schemas.openxmlformats.org/presentationml/2006/main">
   <p:cSld>
+    <p:spTree>
+      <p:nvGrpSpPr>
+        <p:cNvPr id="1" name=""/>
+        <p:cNvGrpSpPr/>
+        <p:nvPr/>
+      </p:nvGrpSpPr>
+      <p:grpSpPr>
+        <a:xfrm>
+          <a:off x="0" y="0"/>
+          <a:ext cx="0" cy="0"/>
+          <a:chOff x="0" y="0"/>
+          <a:chExt cx="0" cy="0"/>
+        </a:xfrm>
+      </p:grpSpPr>
+      <p:sp>
+        <p:nvSpPr>
+          <p:cNvPr id="2" name="Title 1">
+            <a:extLst>
+              <a:ext uri="{FF2B5EF4-FFF2-40B4-BE49-F238E27FC236}">
+                <a16:creationId xmlns:a16="http://schemas.microsoft.com/office/drawing/2014/main" id="{7626E4FF-7C33-4BA7-AF0A-7B82B1A7B82D}"/>
+              </a:ext>
+            </a:extLst>
+          </p:cNvPr>
+          <p:cNvSpPr>
+            <a:spLocks noGrp="1"/>
+          </p:cNvSpPr>
+          <p:nvPr>
+            <p:ph type="title"/>
+          </p:nvPr>
+        </p:nvSpPr>
+        <p:spPr>
+          <a:xfrm>
+            <a:off x="419483" y="-328719"/>
+            <a:ext cx="11023834" cy="1556725"/>
+          </a:xfrm>
+        </p:spPr>
+        <p:txBody>
+          <a:bodyPr vert="horz" lIns="0" tIns="0" rIns="0" bIns="0" rtlCol="0" anchor="b">
+            <a:normAutofit/>
+          </a:bodyPr>
+          <a:lstStyle/>
+          <a:p>
+            <a:r>
+              <a:rPr lang="en-US" sz="3600" dirty="0"/>
+              <a:t>Random Forest classification</a:t>
+            </a:r>
+          </a:p>
+        </p:txBody>
+      </p:sp>
+      <p:sp>
+        <p:nvSpPr>
+          <p:cNvPr id="4" name="TextBox 3">
+            <a:extLst>
+              <a:ext uri="{FF2B5EF4-FFF2-40B4-BE49-F238E27FC236}">
+                <a16:creationId xmlns:a16="http://schemas.microsoft.com/office/drawing/2014/main" id="{711E739A-AAF6-4112-BEEE-2C3B3C5B63F8}"/>
+              </a:ext>
+            </a:extLst>
+          </p:cNvPr>
+          <p:cNvSpPr txBox="1"/>
+          <p:nvPr/>
+        </p:nvSpPr>
+        <p:spPr>
+          <a:xfrm>
+            <a:off x="731318" y="1629387"/>
+            <a:ext cx="4906002" cy="3599226"/>
+          </a:xfrm>
+          <a:prstGeom prst="rect">
+            <a:avLst/>
+          </a:prstGeom>
+        </p:spPr>
+        <p:txBody>
+          <a:bodyPr vert="horz" lIns="0" tIns="0" rIns="0" bIns="0" rtlCol="0">
+            <a:normAutofit/>
+          </a:bodyPr>
+          <a:lstStyle/>
+          <a:p>
+            <a:pPr indent="-228600">
+              <a:lnSpc>
+                <a:spcPct val="120000"/>
+              </a:lnSpc>
+              <a:spcAft>
+                <a:spcPts val="600"/>
+              </a:spcAft>
+              <a:buFont typeface="Arial" panose="020B0604020202020204" pitchFamily="34" charset="0"/>
+              <a:buChar char="•"/>
+            </a:pPr>
+            <a:r>
+              <a:rPr lang="en-US" dirty="0"/>
+              <a:t>The first model was trained using 1,000 decision trees on scaled, but imbalanced data. It reached an accuracy score of 76%.</a:t>
+            </a:r>
+          </a:p>
+        </p:txBody>
+      </p:sp>
+      <p:pic>
+        <p:nvPicPr>
+          <p:cNvPr id="8" name="Picture 7" descr="A screenshot of a cell phone&#10;&#10;Description automatically generated">
+            <a:extLst>
+              <a:ext uri="{FF2B5EF4-FFF2-40B4-BE49-F238E27FC236}">
+                <a16:creationId xmlns:a16="http://schemas.microsoft.com/office/drawing/2014/main" id="{99CB41B2-54BF-4A4B-9E14-C38AD6505D5F}"/>
+              </a:ext>
+            </a:extLst>
+          </p:cNvPr>
+          <p:cNvPicPr>
+            <a:picLocks noChangeAspect="1"/>
+          </p:cNvPicPr>
+          <p:nvPr/>
+        </p:nvPicPr>
+        <p:blipFill>
+          <a:blip r:embed="rId2"/>
+          <a:stretch>
+            <a:fillRect/>
+          </a:stretch>
+        </p:blipFill>
+        <p:spPr>
+          <a:xfrm>
+            <a:off x="6096000" y="2990855"/>
+            <a:ext cx="5390458" cy="2872287"/>
+          </a:xfrm>
+          <a:prstGeom prst="rect">
+            <a:avLst/>
+          </a:prstGeom>
+        </p:spPr>
+      </p:pic>
+      <p:pic>
+        <p:nvPicPr>
+          <p:cNvPr id="20" name="Picture 19">
+            <a:extLst>
+              <a:ext uri="{FF2B5EF4-FFF2-40B4-BE49-F238E27FC236}">
+                <a16:creationId xmlns:a16="http://schemas.microsoft.com/office/drawing/2014/main" id="{7C72B2CD-7228-47EA-9E5A-2CE9CE8F0128}"/>
+              </a:ext>
+            </a:extLst>
+          </p:cNvPr>
+          <p:cNvPicPr>
+            <a:picLocks noChangeAspect="1"/>
+          </p:cNvPicPr>
+          <p:nvPr/>
+        </p:nvPicPr>
+        <p:blipFill>
+          <a:blip r:embed="rId3"/>
+          <a:stretch>
+            <a:fillRect/>
+          </a:stretch>
+        </p:blipFill>
+        <p:spPr>
+          <a:xfrm>
+            <a:off x="665098" y="3550330"/>
+            <a:ext cx="4708851" cy="1487006"/>
+          </a:xfrm>
+          <a:prstGeom prst="rect">
+            <a:avLst/>
+          </a:prstGeom>
+        </p:spPr>
+      </p:pic>
+      <p:sp>
+        <p:nvSpPr>
+          <p:cNvPr id="3" name="Rectangle 2">
+            <a:extLst>
+              <a:ext uri="{FF2B5EF4-FFF2-40B4-BE49-F238E27FC236}">
+                <a16:creationId xmlns:a16="http://schemas.microsoft.com/office/drawing/2014/main" id="{4C39F812-8EA8-4187-BCC4-F270381FE69E}"/>
+              </a:ext>
+            </a:extLst>
+          </p:cNvPr>
+          <p:cNvSpPr/>
+          <p:nvPr/>
+        </p:nvSpPr>
+        <p:spPr>
+          <a:xfrm>
+            <a:off x="6260602" y="1629387"/>
+            <a:ext cx="5225856" cy="1063561"/>
+          </a:xfrm>
+          <a:prstGeom prst="rect">
+            <a:avLst/>
+          </a:prstGeom>
+        </p:spPr>
+        <p:txBody>
+          <a:bodyPr wrap="square">
+            <a:spAutoFit/>
+          </a:bodyPr>
+          <a:lstStyle/>
+          <a:p>
+            <a:pPr indent="-228600">
+              <a:lnSpc>
+                <a:spcPct val="120000"/>
+              </a:lnSpc>
+              <a:spcAft>
+                <a:spcPts val="600"/>
+              </a:spcAft>
+              <a:buFont typeface="Arial" panose="020B0604020202020204" pitchFamily="34" charset="0"/>
+              <a:buChar char="•"/>
+            </a:pPr>
+            <a:r>
+              <a:rPr lang="en-US" dirty="0"/>
+              <a:t>To improve the model, we compared the importance of the features to find out which ones could be dropped.</a:t>
+            </a:r>
+          </a:p>
+        </p:txBody>
+      </p:sp>
+    </p:spTree>
+    <p:extLst>
+      <p:ext uri="{BB962C8B-B14F-4D97-AF65-F5344CB8AC3E}">
+        <p14:creationId xmlns:p14="http://schemas.microsoft.com/office/powerpoint/2010/main" val="2205324478"/>
+      </p:ext>
+    </p:extLst>
+  </p:cSld>
+  <p:clrMapOvr>
+    <a:masterClrMapping/>
+  </p:clrMapOvr>
+</p:sld>
+</file>
+
+<file path=ppt/slides/slide11.xml><?xml version="1.0" encoding="utf-8"?>
+<p:sld xmlns:a="http://schemas.openxmlformats.org/drawingml/2006/main" xmlns:r="http://schemas.openxmlformats.org/officeDocument/2006/relationships" xmlns:p="http://schemas.openxmlformats.org/presentationml/2006/main">
+  <p:cSld>
+    <p:spTree>
+      <p:nvGrpSpPr>
+        <p:cNvPr id="1" name=""/>
+        <p:cNvGrpSpPr/>
+        <p:nvPr/>
+      </p:nvGrpSpPr>
+      <p:grpSpPr>
+        <a:xfrm>
+          <a:off x="0" y="0"/>
+          <a:ext cx="0" cy="0"/>
+          <a:chOff x="0" y="0"/>
+          <a:chExt cx="0" cy="0"/>
+        </a:xfrm>
+      </p:grpSpPr>
+      <p:sp>
+        <p:nvSpPr>
+          <p:cNvPr id="2" name="TextBox 1">
+            <a:extLst>
+              <a:ext uri="{FF2B5EF4-FFF2-40B4-BE49-F238E27FC236}">
+                <a16:creationId xmlns:a16="http://schemas.microsoft.com/office/drawing/2014/main" id="{B72CC41D-AC39-4F58-B8F1-CCFA8CF00050}"/>
+              </a:ext>
+            </a:extLst>
+          </p:cNvPr>
+          <p:cNvSpPr txBox="1"/>
+          <p:nvPr/>
+        </p:nvSpPr>
+        <p:spPr>
+          <a:xfrm>
+            <a:off x="990600" y="904876"/>
+            <a:ext cx="4680235" cy="2470100"/>
+          </a:xfrm>
+          <a:prstGeom prst="rect">
+            <a:avLst/>
+          </a:prstGeom>
+          <a:noFill/>
+        </p:spPr>
+        <p:txBody>
+          <a:bodyPr wrap="square" rtlCol="0">
+            <a:spAutoFit/>
+          </a:bodyPr>
+          <a:lstStyle/>
+          <a:p>
+            <a:pPr indent="-228600">
+              <a:lnSpc>
+                <a:spcPct val="120000"/>
+              </a:lnSpc>
+              <a:spcAft>
+                <a:spcPts val="600"/>
+              </a:spcAft>
+              <a:buFont typeface="Arial" panose="020B0604020202020204" pitchFamily="34" charset="0"/>
+              <a:buChar char="•"/>
+            </a:pPr>
+            <a:r>
+              <a:rPr lang="en-US" dirty="0"/>
+              <a:t>The least significant columns were dropped and by using the </a:t>
+            </a:r>
+            <a:r>
+              <a:rPr lang="en-US" dirty="0" err="1"/>
+              <a:t>RandomOverSampler</a:t>
+            </a:r>
+            <a:r>
+              <a:rPr lang="en-US" dirty="0"/>
+              <a:t> method, the data was balanced.</a:t>
+            </a:r>
+          </a:p>
+          <a:p>
+            <a:pPr indent="-228600">
+              <a:lnSpc>
+                <a:spcPct val="120000"/>
+              </a:lnSpc>
+              <a:spcAft>
+                <a:spcPts val="600"/>
+              </a:spcAft>
+              <a:buFont typeface="Arial" panose="020B0604020202020204" pitchFamily="34" charset="0"/>
+              <a:buChar char="•"/>
+            </a:pPr>
+            <a:r>
+              <a:rPr lang="en-US" dirty="0"/>
+              <a:t>The second model trained with 3,000 decision trees, balanced data, and less features reached an accuracy score of 87%.</a:t>
+            </a:r>
+          </a:p>
+        </p:txBody>
+      </p:sp>
+      <p:pic>
+        <p:nvPicPr>
+          <p:cNvPr id="4" name="Picture 3">
+            <a:extLst>
+              <a:ext uri="{FF2B5EF4-FFF2-40B4-BE49-F238E27FC236}">
+                <a16:creationId xmlns:a16="http://schemas.microsoft.com/office/drawing/2014/main" id="{5A142BCC-5867-47AE-AD49-B6C3B97D3B65}"/>
+              </a:ext>
+            </a:extLst>
+          </p:cNvPr>
+          <p:cNvPicPr>
+            <a:picLocks noChangeAspect="1"/>
+          </p:cNvPicPr>
+          <p:nvPr/>
+        </p:nvPicPr>
+        <p:blipFill>
+          <a:blip r:embed="rId2"/>
+          <a:stretch>
+            <a:fillRect/>
+          </a:stretch>
+        </p:blipFill>
+        <p:spPr>
+          <a:xfrm>
+            <a:off x="6096000" y="767179"/>
+            <a:ext cx="4680235" cy="1487749"/>
+          </a:xfrm>
+          <a:prstGeom prst="rect">
+            <a:avLst/>
+          </a:prstGeom>
+        </p:spPr>
+      </p:pic>
+      <p:pic>
+        <p:nvPicPr>
+          <p:cNvPr id="6" name="Picture 5">
+            <a:extLst>
+              <a:ext uri="{FF2B5EF4-FFF2-40B4-BE49-F238E27FC236}">
+                <a16:creationId xmlns:a16="http://schemas.microsoft.com/office/drawing/2014/main" id="{D4110231-D85A-4199-B30E-7522AEB75B9B}"/>
+              </a:ext>
+            </a:extLst>
+          </p:cNvPr>
+          <p:cNvPicPr>
+            <a:picLocks noChangeAspect="1"/>
+          </p:cNvPicPr>
+          <p:nvPr/>
+        </p:nvPicPr>
+        <p:blipFill>
+          <a:blip r:embed="rId3"/>
+          <a:stretch>
+            <a:fillRect/>
+          </a:stretch>
+        </p:blipFill>
+        <p:spPr>
+          <a:xfrm>
+            <a:off x="6500594" y="2707127"/>
+            <a:ext cx="4399029" cy="3201313"/>
+          </a:xfrm>
+          <a:prstGeom prst="rect">
+            <a:avLst/>
+          </a:prstGeom>
+        </p:spPr>
+      </p:pic>
+    </p:spTree>
+    <p:extLst>
+      <p:ext uri="{BB962C8B-B14F-4D97-AF65-F5344CB8AC3E}">
+        <p14:creationId xmlns:p14="http://schemas.microsoft.com/office/powerpoint/2010/main" val="2047011490"/>
+      </p:ext>
+    </p:extLst>
+  </p:cSld>
+  <p:clrMapOvr>
+    <a:masterClrMapping/>
+  </p:clrMapOvr>
+</p:sld>
+</file>
+
+<file path=ppt/slides/slide12.xml><?xml version="1.0" encoding="utf-8"?>
+<p:sld xmlns:a="http://schemas.openxmlformats.org/drawingml/2006/main" xmlns:r="http://schemas.openxmlformats.org/officeDocument/2006/relationships" xmlns:p="http://schemas.openxmlformats.org/presentationml/2006/main">
+  <p:cSld>
     <p:bg>
       <p:bgPr>
         <a:solidFill>
@@ -4412,378 +4784,6 @@
     <p:extLst>
       <p:ext uri="{BB962C8B-B14F-4D97-AF65-F5344CB8AC3E}">
         <p14:creationId xmlns:p14="http://schemas.microsoft.com/office/powerpoint/2010/main" val="2992775924"/>
-      </p:ext>
-    </p:extLst>
-  </p:cSld>
-  <p:clrMapOvr>
-    <a:masterClrMapping/>
-  </p:clrMapOvr>
-</p:sld>
-</file>
-
-<file path=ppt/slides/slide11.xml><?xml version="1.0" encoding="utf-8"?>
-<p:sld xmlns:a="http://schemas.openxmlformats.org/drawingml/2006/main" xmlns:r="http://schemas.openxmlformats.org/officeDocument/2006/relationships" xmlns:p="http://schemas.openxmlformats.org/presentationml/2006/main">
-  <p:cSld>
-    <p:spTree>
-      <p:nvGrpSpPr>
-        <p:cNvPr id="1" name=""/>
-        <p:cNvGrpSpPr/>
-        <p:nvPr/>
-      </p:nvGrpSpPr>
-      <p:grpSpPr>
-        <a:xfrm>
-          <a:off x="0" y="0"/>
-          <a:ext cx="0" cy="0"/>
-          <a:chOff x="0" y="0"/>
-          <a:chExt cx="0" cy="0"/>
-        </a:xfrm>
-      </p:grpSpPr>
-      <p:sp>
-        <p:nvSpPr>
-          <p:cNvPr id="2" name="Title 1">
-            <a:extLst>
-              <a:ext uri="{FF2B5EF4-FFF2-40B4-BE49-F238E27FC236}">
-                <a16:creationId xmlns:a16="http://schemas.microsoft.com/office/drawing/2014/main" id="{7626E4FF-7C33-4BA7-AF0A-7B82B1A7B82D}"/>
-              </a:ext>
-            </a:extLst>
-          </p:cNvPr>
-          <p:cNvSpPr>
-            <a:spLocks noGrp="1"/>
-          </p:cNvSpPr>
-          <p:nvPr>
-            <p:ph type="title"/>
-          </p:nvPr>
-        </p:nvSpPr>
-        <p:spPr>
-          <a:xfrm>
-            <a:off x="419483" y="-328719"/>
-            <a:ext cx="11023834" cy="1556725"/>
-          </a:xfrm>
-        </p:spPr>
-        <p:txBody>
-          <a:bodyPr vert="horz" lIns="0" tIns="0" rIns="0" bIns="0" rtlCol="0" anchor="b">
-            <a:normAutofit/>
-          </a:bodyPr>
-          <a:lstStyle/>
-          <a:p>
-            <a:r>
-              <a:rPr lang="en-US" sz="3600" dirty="0"/>
-              <a:t>Random Forest classification</a:t>
-            </a:r>
-          </a:p>
-        </p:txBody>
-      </p:sp>
-      <p:sp>
-        <p:nvSpPr>
-          <p:cNvPr id="4" name="TextBox 3">
-            <a:extLst>
-              <a:ext uri="{FF2B5EF4-FFF2-40B4-BE49-F238E27FC236}">
-                <a16:creationId xmlns:a16="http://schemas.microsoft.com/office/drawing/2014/main" id="{711E739A-AAF6-4112-BEEE-2C3B3C5B63F8}"/>
-              </a:ext>
-            </a:extLst>
-          </p:cNvPr>
-          <p:cNvSpPr txBox="1"/>
-          <p:nvPr/>
-        </p:nvSpPr>
-        <p:spPr>
-          <a:xfrm>
-            <a:off x="731318" y="1629387"/>
-            <a:ext cx="4906002" cy="3599226"/>
-          </a:xfrm>
-          <a:prstGeom prst="rect">
-            <a:avLst/>
-          </a:prstGeom>
-        </p:spPr>
-        <p:txBody>
-          <a:bodyPr vert="horz" lIns="0" tIns="0" rIns="0" bIns="0" rtlCol="0">
-            <a:normAutofit/>
-          </a:bodyPr>
-          <a:lstStyle/>
-          <a:p>
-            <a:pPr indent="-228600">
-              <a:lnSpc>
-                <a:spcPct val="120000"/>
-              </a:lnSpc>
-              <a:spcAft>
-                <a:spcPts val="600"/>
-              </a:spcAft>
-              <a:buFont typeface="Arial" panose="020B0604020202020204" pitchFamily="34" charset="0"/>
-              <a:buChar char="•"/>
-            </a:pPr>
-            <a:r>
-              <a:rPr lang="en-US" dirty="0"/>
-              <a:t>The first model was trained using 1,000 decision trees on scaled, but imbalanced data. It reached an accuracy score of 76%.</a:t>
-            </a:r>
-          </a:p>
-        </p:txBody>
-      </p:sp>
-      <p:pic>
-        <p:nvPicPr>
-          <p:cNvPr id="8" name="Picture 7" descr="A screenshot of a cell phone&#10;&#10;Description automatically generated">
-            <a:extLst>
-              <a:ext uri="{FF2B5EF4-FFF2-40B4-BE49-F238E27FC236}">
-                <a16:creationId xmlns:a16="http://schemas.microsoft.com/office/drawing/2014/main" id="{99CB41B2-54BF-4A4B-9E14-C38AD6505D5F}"/>
-              </a:ext>
-            </a:extLst>
-          </p:cNvPr>
-          <p:cNvPicPr>
-            <a:picLocks noChangeAspect="1"/>
-          </p:cNvPicPr>
-          <p:nvPr/>
-        </p:nvPicPr>
-        <p:blipFill>
-          <a:blip r:embed="rId2"/>
-          <a:stretch>
-            <a:fillRect/>
-          </a:stretch>
-        </p:blipFill>
-        <p:spPr>
-          <a:xfrm>
-            <a:off x="6096000" y="2990855"/>
-            <a:ext cx="5390458" cy="2872287"/>
-          </a:xfrm>
-          <a:prstGeom prst="rect">
-            <a:avLst/>
-          </a:prstGeom>
-        </p:spPr>
-      </p:pic>
-      <p:pic>
-        <p:nvPicPr>
-          <p:cNvPr id="20" name="Picture 19">
-            <a:extLst>
-              <a:ext uri="{FF2B5EF4-FFF2-40B4-BE49-F238E27FC236}">
-                <a16:creationId xmlns:a16="http://schemas.microsoft.com/office/drawing/2014/main" id="{7C72B2CD-7228-47EA-9E5A-2CE9CE8F0128}"/>
-              </a:ext>
-            </a:extLst>
-          </p:cNvPr>
-          <p:cNvPicPr>
-            <a:picLocks noChangeAspect="1"/>
-          </p:cNvPicPr>
-          <p:nvPr/>
-        </p:nvPicPr>
-        <p:blipFill>
-          <a:blip r:embed="rId3"/>
-          <a:stretch>
-            <a:fillRect/>
-          </a:stretch>
-        </p:blipFill>
-        <p:spPr>
-          <a:xfrm>
-            <a:off x="665098" y="3550330"/>
-            <a:ext cx="4708851" cy="1487006"/>
-          </a:xfrm>
-          <a:prstGeom prst="rect">
-            <a:avLst/>
-          </a:prstGeom>
-        </p:spPr>
-      </p:pic>
-      <p:sp>
-        <p:nvSpPr>
-          <p:cNvPr id="3" name="Rectangle 2">
-            <a:extLst>
-              <a:ext uri="{FF2B5EF4-FFF2-40B4-BE49-F238E27FC236}">
-                <a16:creationId xmlns:a16="http://schemas.microsoft.com/office/drawing/2014/main" id="{4C39F812-8EA8-4187-BCC4-F270381FE69E}"/>
-              </a:ext>
-            </a:extLst>
-          </p:cNvPr>
-          <p:cNvSpPr/>
-          <p:nvPr/>
-        </p:nvSpPr>
-        <p:spPr>
-          <a:xfrm>
-            <a:off x="6260602" y="1629387"/>
-            <a:ext cx="5225856" cy="1063561"/>
-          </a:xfrm>
-          <a:prstGeom prst="rect">
-            <a:avLst/>
-          </a:prstGeom>
-        </p:spPr>
-        <p:txBody>
-          <a:bodyPr wrap="square">
-            <a:spAutoFit/>
-          </a:bodyPr>
-          <a:lstStyle/>
-          <a:p>
-            <a:pPr indent="-228600">
-              <a:lnSpc>
-                <a:spcPct val="120000"/>
-              </a:lnSpc>
-              <a:spcAft>
-                <a:spcPts val="600"/>
-              </a:spcAft>
-              <a:buFont typeface="Arial" panose="020B0604020202020204" pitchFamily="34" charset="0"/>
-              <a:buChar char="•"/>
-            </a:pPr>
-            <a:r>
-              <a:rPr lang="en-US" dirty="0"/>
-              <a:t>To improve the model, we compared the importance of the features to find out which ones could be dropped.</a:t>
-            </a:r>
-          </a:p>
-        </p:txBody>
-      </p:sp>
-    </p:spTree>
-    <p:extLst>
-      <p:ext uri="{BB962C8B-B14F-4D97-AF65-F5344CB8AC3E}">
-        <p14:creationId xmlns:p14="http://schemas.microsoft.com/office/powerpoint/2010/main" val="2205324478"/>
-      </p:ext>
-    </p:extLst>
-  </p:cSld>
-  <p:clrMapOvr>
-    <a:masterClrMapping/>
-  </p:clrMapOvr>
-</p:sld>
-</file>
-
-<file path=ppt/slides/slide12.xml><?xml version="1.0" encoding="utf-8"?>
-<p:sld xmlns:a="http://schemas.openxmlformats.org/drawingml/2006/main" xmlns:r="http://schemas.openxmlformats.org/officeDocument/2006/relationships" xmlns:p="http://schemas.openxmlformats.org/presentationml/2006/main">
-  <p:cSld>
-    <p:spTree>
-      <p:nvGrpSpPr>
-        <p:cNvPr id="1" name=""/>
-        <p:cNvGrpSpPr/>
-        <p:nvPr/>
-      </p:nvGrpSpPr>
-      <p:grpSpPr>
-        <a:xfrm>
-          <a:off x="0" y="0"/>
-          <a:ext cx="0" cy="0"/>
-          <a:chOff x="0" y="0"/>
-          <a:chExt cx="0" cy="0"/>
-        </a:xfrm>
-      </p:grpSpPr>
-      <p:sp>
-        <p:nvSpPr>
-          <p:cNvPr id="2" name="TextBox 1">
-            <a:extLst>
-              <a:ext uri="{FF2B5EF4-FFF2-40B4-BE49-F238E27FC236}">
-                <a16:creationId xmlns:a16="http://schemas.microsoft.com/office/drawing/2014/main" id="{B72CC41D-AC39-4F58-B8F1-CCFA8CF00050}"/>
-              </a:ext>
-            </a:extLst>
-          </p:cNvPr>
-          <p:cNvSpPr txBox="1"/>
-          <p:nvPr/>
-        </p:nvSpPr>
-        <p:spPr>
-          <a:xfrm>
-            <a:off x="990600" y="904876"/>
-            <a:ext cx="4680235" cy="2470100"/>
-          </a:xfrm>
-          <a:prstGeom prst="rect">
-            <a:avLst/>
-          </a:prstGeom>
-          <a:noFill/>
-        </p:spPr>
-        <p:txBody>
-          <a:bodyPr wrap="square" rtlCol="0">
-            <a:spAutoFit/>
-          </a:bodyPr>
-          <a:lstStyle/>
-          <a:p>
-            <a:pPr indent="-228600">
-              <a:lnSpc>
-                <a:spcPct val="120000"/>
-              </a:lnSpc>
-              <a:spcAft>
-                <a:spcPts val="600"/>
-              </a:spcAft>
-              <a:buFont typeface="Arial" panose="020B0604020202020204" pitchFamily="34" charset="0"/>
-              <a:buChar char="•"/>
-            </a:pPr>
-            <a:r>
-              <a:rPr lang="en-US" dirty="0"/>
-              <a:t>The least significant columns were dropped and by using the </a:t>
-            </a:r>
-            <a:r>
-              <a:rPr lang="en-US" dirty="0" err="1"/>
-              <a:t>RandomOverSampler</a:t>
-            </a:r>
-            <a:r>
-              <a:rPr lang="en-US" dirty="0"/>
-              <a:t> method, the data was balanced.</a:t>
-            </a:r>
-          </a:p>
-          <a:p>
-            <a:pPr indent="-228600">
-              <a:lnSpc>
-                <a:spcPct val="120000"/>
-              </a:lnSpc>
-              <a:spcAft>
-                <a:spcPts val="600"/>
-              </a:spcAft>
-              <a:buFont typeface="Arial" panose="020B0604020202020204" pitchFamily="34" charset="0"/>
-              <a:buChar char="•"/>
-            </a:pPr>
-            <a:r>
-              <a:rPr lang="en-US" dirty="0"/>
-              <a:t>The second model trained with 3,000 decision trees, balanced data, and less features reached an accuracy score of 87%.</a:t>
-            </a:r>
-          </a:p>
-        </p:txBody>
-      </p:sp>
-      <p:pic>
-        <p:nvPicPr>
-          <p:cNvPr id="4" name="Picture 3">
-            <a:extLst>
-              <a:ext uri="{FF2B5EF4-FFF2-40B4-BE49-F238E27FC236}">
-                <a16:creationId xmlns:a16="http://schemas.microsoft.com/office/drawing/2014/main" id="{5A142BCC-5867-47AE-AD49-B6C3B97D3B65}"/>
-              </a:ext>
-            </a:extLst>
-          </p:cNvPr>
-          <p:cNvPicPr>
-            <a:picLocks noChangeAspect="1"/>
-          </p:cNvPicPr>
-          <p:nvPr/>
-        </p:nvPicPr>
-        <p:blipFill>
-          <a:blip r:embed="rId2"/>
-          <a:stretch>
-            <a:fillRect/>
-          </a:stretch>
-        </p:blipFill>
-        <p:spPr>
-          <a:xfrm>
-            <a:off x="6096000" y="767179"/>
-            <a:ext cx="4680235" cy="1487749"/>
-          </a:xfrm>
-          <a:prstGeom prst="rect">
-            <a:avLst/>
-          </a:prstGeom>
-        </p:spPr>
-      </p:pic>
-      <p:pic>
-        <p:nvPicPr>
-          <p:cNvPr id="6" name="Picture 5">
-            <a:extLst>
-              <a:ext uri="{FF2B5EF4-FFF2-40B4-BE49-F238E27FC236}">
-                <a16:creationId xmlns:a16="http://schemas.microsoft.com/office/drawing/2014/main" id="{D4110231-D85A-4199-B30E-7522AEB75B9B}"/>
-              </a:ext>
-            </a:extLst>
-          </p:cNvPr>
-          <p:cNvPicPr>
-            <a:picLocks noChangeAspect="1"/>
-          </p:cNvPicPr>
-          <p:nvPr/>
-        </p:nvPicPr>
-        <p:blipFill>
-          <a:blip r:embed="rId3"/>
-          <a:stretch>
-            <a:fillRect/>
-          </a:stretch>
-        </p:blipFill>
-        <p:spPr>
-          <a:xfrm>
-            <a:off x="6500594" y="2707127"/>
-            <a:ext cx="4399029" cy="3201313"/>
-          </a:xfrm>
-          <a:prstGeom prst="rect">
-            <a:avLst/>
-          </a:prstGeom>
-        </p:spPr>
-      </p:pic>
-    </p:spTree>
-    <p:extLst>
-      <p:ext uri="{BB962C8B-B14F-4D97-AF65-F5344CB8AC3E}">
-        <p14:creationId xmlns:p14="http://schemas.microsoft.com/office/powerpoint/2010/main" val="2047011490"/>
       </p:ext>
     </p:extLst>
   </p:cSld>

</xml_diff>